<commit_message>
Strava Auth Service code examples
</commit_message>
<xml_diff>
--- a/strava-like/docs/img/component-design.pptx
+++ b/strava-like/docs/img/component-design.pptx
@@ -3482,7 +3482,7 @@
         </p:nvSpPr>
         <p:spPr>
           <a:xfrm>
-            <a:off x="2519918" y="579475"/>
+            <a:off x="2512416" y="579475"/>
             <a:ext cx="6602818" cy="871869"/>
           </a:xfrm>
           <a:prstGeom prst="rect">
@@ -3726,6 +3726,90 @@
           </a:p>
         </p:txBody>
       </p:sp>
+      <p:cxnSp>
+        <p:nvCxnSpPr>
+          <p:cNvPr id="14" name="Straight Arrow Connector 13">
+            <a:extLst>
+              <a:ext uri="{FF2B5EF4-FFF2-40B4-BE49-F238E27FC236}">
+                <a16:creationId xmlns:a16="http://schemas.microsoft.com/office/drawing/2014/main" id="{2D7273F0-15FF-3E8F-5426-CD583C603FA4}"/>
+              </a:ext>
+            </a:extLst>
+          </p:cNvPr>
+          <p:cNvCxnSpPr>
+            <a:stCxn id="5" idx="2"/>
+            <a:endCxn id="10" idx="1"/>
+          </p:cNvCxnSpPr>
+          <p:nvPr/>
+        </p:nvCxnSpPr>
+        <p:spPr>
+          <a:xfrm>
+            <a:off x="5813825" y="5126808"/>
+            <a:ext cx="7502" cy="475017"/>
+          </a:xfrm>
+          <a:prstGeom prst="straightConnector1">
+            <a:avLst/>
+          </a:prstGeom>
+          <a:ln>
+            <a:tailEnd type="triangle"/>
+          </a:ln>
+        </p:spPr>
+        <p:style>
+          <a:lnRef idx="2">
+            <a:schemeClr val="accent1"/>
+          </a:lnRef>
+          <a:fillRef idx="0">
+            <a:schemeClr val="accent1"/>
+          </a:fillRef>
+          <a:effectRef idx="1">
+            <a:schemeClr val="accent1"/>
+          </a:effectRef>
+          <a:fontRef idx="minor">
+            <a:schemeClr val="tx1"/>
+          </a:fontRef>
+        </p:style>
+      </p:cxnSp>
+      <p:cxnSp>
+        <p:nvCxnSpPr>
+          <p:cNvPr id="16" name="Straight Arrow Connector 15">
+            <a:extLst>
+              <a:ext uri="{FF2B5EF4-FFF2-40B4-BE49-F238E27FC236}">
+                <a16:creationId xmlns:a16="http://schemas.microsoft.com/office/drawing/2014/main" id="{383CEFFD-39A4-EB23-8713-A0EAACDEB6FA}"/>
+              </a:ext>
+            </a:extLst>
+          </p:cNvPr>
+          <p:cNvCxnSpPr>
+            <a:stCxn id="7" idx="2"/>
+            <a:endCxn id="6" idx="0"/>
+          </p:cNvCxnSpPr>
+          <p:nvPr/>
+        </p:nvCxnSpPr>
+        <p:spPr>
+          <a:xfrm>
+            <a:off x="5813825" y="1451344"/>
+            <a:ext cx="0" cy="611517"/>
+          </a:xfrm>
+          <a:prstGeom prst="straightConnector1">
+            <a:avLst/>
+          </a:prstGeom>
+          <a:ln>
+            <a:tailEnd type="triangle"/>
+          </a:ln>
+        </p:spPr>
+        <p:style>
+          <a:lnRef idx="2">
+            <a:schemeClr val="accent1"/>
+          </a:lnRef>
+          <a:fillRef idx="0">
+            <a:schemeClr val="accent1"/>
+          </a:fillRef>
+          <a:effectRef idx="1">
+            <a:schemeClr val="accent1"/>
+          </a:effectRef>
+          <a:fontRef idx="minor">
+            <a:schemeClr val="tx1"/>
+          </a:fontRef>
+        </p:style>
+      </p:cxnSp>
     </p:spTree>
     <p:extLst>
       <p:ext uri="{BB962C8B-B14F-4D97-AF65-F5344CB8AC3E}">

</xml_diff>